<commit_message>
update aspnetcore m9 slides
</commit_message>
<xml_diff>
--- a/aspnetcore/slides/09_entityframework.pptx
+++ b/aspnetcore/slides/09_entityframework.pptx
@@ -293,7 +293,7 @@
               <a:pPr>
                 <a:defRPr/>
               </a:pPr>
-              <a:t>11/4/2018</a:t>
+              <a:t>9/5/2019</a:t>
             </a:fld>
             <a:endParaRPr lang="en-US"/>
           </a:p>
@@ -3746,7 +3746,7 @@
           <a:p>
             <a:r>
               <a:rPr lang="en-US" dirty="0"/>
-              <a:t>Global tool installed with the SDK</a:t>
+              <a:t>Install with “dotnet tool”</a:t>
             </a:r>
           </a:p>
           <a:p>

</xml_diff>